<commit_message>
Mailgun for fireAlarm and burglerAlarm
</commit_message>
<xml_diff>
--- a/Documentation/Presentation/Project presentation - Lars Juhl.pptx
+++ b/Documentation/Presentation/Project presentation - Lars Juhl.pptx
@@ -11,7 +11,6 @@
     <p:sldId id="259" r:id="rId5"/>
     <p:sldId id="262" r:id="rId6"/>
     <p:sldId id="260" r:id="rId7"/>
-    <p:sldId id="261" r:id="rId8"/>
   </p:sldIdLst>
   <p:sldSz cx="12192000" cy="6858000"/>
   <p:notesSz cx="6858000" cy="9144000"/>
@@ -110,6 +109,11 @@
       </a:defRPr>
     </a:lvl9pPr>
   </p:defaultTextStyle>
+  <p:extLst>
+    <p:ext uri="{EFAFB233-063F-42B5-8137-9DF3F51BA10A}">
+      <p15:sldGuideLst xmlns:p15="http://schemas.microsoft.com/office/powerpoint/2012/main"/>
+    </p:ext>
+  </p:extLst>
 </p:presentation>
 </file>
 
@@ -298,7 +302,7 @@
           <a:p>
             <a:fld id="{88D38747-4367-4BD2-8D51-C97E202738E2}" type="datetime1">
               <a:rPr lang="en-US" smtClean="0"/>
-              <a:t>11/18/19</a:t>
+              <a:t>11/24/19</a:t>
             </a:fld>
             <a:endParaRPr lang="en-US" dirty="0"/>
           </a:p>
@@ -603,7 +607,7 @@
           <a:p>
             <a:fld id="{11F1B079-7EF0-44EE-B798-BCC497C9F3B2}" type="datetime1">
               <a:rPr lang="en-US" smtClean="0"/>
-              <a:t>11/18/19</a:t>
+              <a:t>11/24/19</a:t>
             </a:fld>
             <a:endParaRPr lang="en-US" dirty="0"/>
           </a:p>
@@ -797,7 +801,7 @@
           <a:p>
             <a:fld id="{28FF70A8-1D13-4657-95F0-A9EA54967B8D}" type="datetime1">
               <a:rPr lang="en-US" smtClean="0"/>
-              <a:t>11/18/19</a:t>
+              <a:t>11/24/19</a:t>
             </a:fld>
             <a:endParaRPr lang="en-US" dirty="0"/>
           </a:p>
@@ -1060,7 +1064,7 @@
           <a:p>
             <a:fld id="{21EB90AC-71BD-4C7F-8ACA-7B3F18292E63}" type="datetime1">
               <a:rPr lang="en-US" smtClean="0"/>
-              <a:t>11/18/19</a:t>
+              <a:t>11/24/19</a:t>
             </a:fld>
             <a:endParaRPr lang="en-US" dirty="0"/>
           </a:p>
@@ -1496,7 +1500,7 @@
           <a:p>
             <a:fld id="{4E6EFC2C-8905-46F0-B443-CE905B76BA01}" type="datetime1">
               <a:rPr lang="en-US" smtClean="0"/>
-              <a:t>11/18/19</a:t>
+              <a:t>11/24/19</a:t>
             </a:fld>
             <a:endParaRPr lang="en-US" dirty="0"/>
           </a:p>
@@ -2033,7 +2037,7 @@
           <a:p>
             <a:fld id="{D9079DC3-C9B5-499E-9140-0DC28B7074E2}" type="datetime1">
               <a:rPr lang="en-US" smtClean="0"/>
-              <a:t>11/18/19</a:t>
+              <a:t>11/24/19</a:t>
             </a:fld>
             <a:endParaRPr lang="en-US" dirty="0"/>
           </a:p>
@@ -2915,7 +2919,7 @@
           <a:p>
             <a:fld id="{30BB33EA-E472-4D22-9C03-A9C14AA21CED}" type="datetime1">
               <a:rPr lang="en-US" smtClean="0"/>
-              <a:t>11/18/19</a:t>
+              <a:t>11/24/19</a:t>
             </a:fld>
             <a:endParaRPr lang="en-US" dirty="0"/>
           </a:p>
@@ -3085,7 +3089,7 @@
           <a:p>
             <a:fld id="{217E833E-1B6D-415F-AD29-75AE8C43BD0D}" type="datetime1">
               <a:rPr lang="en-US" smtClean="0"/>
-              <a:t>11/18/19</a:t>
+              <a:t>11/24/19</a:t>
             </a:fld>
             <a:endParaRPr lang="en-US" dirty="0"/>
           </a:p>
@@ -3269,7 +3273,7 @@
           <a:p>
             <a:fld id="{8452596F-08A7-4B70-989A-F2B1CF31E66B}" type="datetime1">
               <a:rPr lang="en-US" smtClean="0"/>
-              <a:t>11/18/19</a:t>
+              <a:t>11/24/19</a:t>
             </a:fld>
             <a:endParaRPr lang="en-US" dirty="0"/>
           </a:p>
@@ -3439,7 +3443,7 @@
           <a:p>
             <a:fld id="{73C55A3C-5767-4844-A0A3-83778C2E5409}" type="datetime1">
               <a:rPr lang="en-US" smtClean="0"/>
-              <a:t>11/18/19</a:t>
+              <a:t>11/24/19</a:t>
             </a:fld>
             <a:endParaRPr lang="en-US" dirty="0"/>
           </a:p>
@@ -3683,7 +3687,7 @@
           <a:p>
             <a:fld id="{CAE507A8-A5CF-4D38-AB86-7EDDA87A85D4}" type="datetime1">
               <a:rPr lang="en-US" smtClean="0"/>
-              <a:t>11/18/19</a:t>
+              <a:t>11/24/19</a:t>
             </a:fld>
             <a:endParaRPr lang="en-US" dirty="0"/>
           </a:p>
@@ -3925,7 +3929,7 @@
           <a:p>
             <a:fld id="{BDFCD27C-8599-43EF-BA1D-14DDC1946E06}" type="datetime1">
               <a:rPr lang="en-US" smtClean="0"/>
-              <a:t>11/18/19</a:t>
+              <a:t>11/24/19</a:t>
             </a:fld>
             <a:endParaRPr lang="en-US" dirty="0"/>
           </a:p>
@@ -4406,7 +4410,7 @@
           <a:p>
             <a:fld id="{49343D99-809A-49C0-96E5-4250D0B498EE}" type="datetime1">
               <a:rPr lang="en-US" smtClean="0"/>
-              <a:t>11/18/19</a:t>
+              <a:t>11/24/19</a:t>
             </a:fld>
             <a:endParaRPr lang="en-US" dirty="0"/>
           </a:p>
@@ -4524,7 +4528,7 @@
           <a:p>
             <a:fld id="{A143DE9B-B678-4EFB-BB7D-A4370204A0B0}" type="datetime1">
               <a:rPr lang="en-US" smtClean="0"/>
-              <a:t>11/18/19</a:t>
+              <a:t>11/24/19</a:t>
             </a:fld>
             <a:endParaRPr lang="en-US" dirty="0"/>
           </a:p>
@@ -4619,7 +4623,7 @@
           <a:p>
             <a:fld id="{E68812DA-F765-4142-A6A3-A8ED7235E082}" type="datetime1">
               <a:rPr lang="en-US" smtClean="0"/>
-              <a:t>11/18/19</a:t>
+              <a:t>11/24/19</a:t>
             </a:fld>
             <a:endParaRPr lang="en-US" dirty="0"/>
           </a:p>
@@ -4874,7 +4878,7 @@
           <a:p>
             <a:fld id="{3E0277FD-7DE6-41D4-930D-AC99F5AFE54E}" type="datetime1">
               <a:rPr lang="en-US" smtClean="0"/>
-              <a:t>11/18/19</a:t>
+              <a:t>11/24/19</a:t>
             </a:fld>
             <a:endParaRPr lang="en-US" dirty="0"/>
           </a:p>
@@ -5181,7 +5185,7 @@
           <a:p>
             <a:fld id="{9EA15526-7079-4B7B-987C-1B5FAE11A0FF}" type="datetime1">
               <a:rPr lang="en-US" smtClean="0"/>
-              <a:t>11/18/19</a:t>
+              <a:t>11/24/19</a:t>
             </a:fld>
             <a:endParaRPr lang="en-US" dirty="0"/>
           </a:p>
@@ -5416,7 +5420,7 @@
           <a:p>
             <a:fld id="{073ED0CC-082F-4160-86E5-0D6041F12778}" type="datetime1">
               <a:rPr lang="en-US" smtClean="0"/>
-              <a:t>11/18/19</a:t>
+              <a:t>11/24/19</a:t>
             </a:fld>
             <a:endParaRPr lang="en-US" dirty="0"/>
           </a:p>
@@ -7715,463 +7719,6 @@
 </p:sld>
 </file>
 
-<file path=ppt/slides/slide7.xml><?xml version="1.0" encoding="utf-8"?>
-<p:sld xmlns:a="http://schemas.openxmlformats.org/drawingml/2006/main" xmlns:r="http://schemas.openxmlformats.org/officeDocument/2006/relationships" xmlns:p="http://schemas.openxmlformats.org/presentationml/2006/main">
-  <p:cSld>
-    <p:bg>
-      <p:bgPr>
-        <a:solidFill>
-          <a:schemeClr val="bg1"/>
-        </a:solidFill>
-        <a:effectLst/>
-      </p:bgPr>
-    </p:bg>
-    <p:spTree>
-      <p:nvGrpSpPr>
-        <p:cNvPr id="1" name=""/>
-        <p:cNvGrpSpPr/>
-        <p:nvPr/>
-      </p:nvGrpSpPr>
-      <p:grpSpPr>
-        <a:xfrm>
-          <a:off x="0" y="0"/>
-          <a:ext cx="0" cy="0"/>
-          <a:chOff x="0" y="0"/>
-          <a:chExt cx="0" cy="0"/>
-        </a:xfrm>
-      </p:grpSpPr>
-      <p:sp>
-        <p:nvSpPr>
-          <p:cNvPr id="8" name="Rectangle 7">
-            <a:extLst>
-              <a:ext uri="{FF2B5EF4-FFF2-40B4-BE49-F238E27FC236}">
-                <a16:creationId xmlns:a16="http://schemas.microsoft.com/office/drawing/2014/main" id="{1C3D9BD5-A493-4B97-963D-60135D533822}"/>
-              </a:ext>
-              <a:ext uri="{C183D7F6-B498-43B3-948B-1728B52AA6E4}">
-                <adec:decorative xmlns:adec="http://schemas.microsoft.com/office/drawing/2017/decorative" val="1"/>
-              </a:ext>
-            </a:extLst>
-          </p:cNvPr>
-          <p:cNvSpPr>
-            <a:spLocks noGrp="1" noRot="1" noChangeAspect="1" noMove="1" noResize="1" noEditPoints="1" noAdjustHandles="1" noChangeArrowheads="1" noChangeShapeType="1" noTextEdit="1"/>
-          </p:cNvSpPr>
-          <p:nvPr>
-            <p:extLst>
-              <p:ext uri="{386F3935-93C4-4BCD-93E2-E3B085C9AB24}">
-                <p16:designElem xmlns:p16="http://schemas.microsoft.com/office/powerpoint/2015/main" val="1"/>
-              </p:ext>
-            </p:extLst>
-          </p:nvPr>
-        </p:nvSpPr>
-        <p:spPr>
-          <a:xfrm>
-            <a:off x="0" y="0"/>
-            <a:ext cx="12192000" cy="6858000"/>
-          </a:xfrm>
-          <a:prstGeom prst="rect">
-            <a:avLst/>
-          </a:prstGeom>
-          <a:ln>
-            <a:noFill/>
-          </a:ln>
-        </p:spPr>
-        <p:style>
-          <a:lnRef idx="2">
-            <a:schemeClr val="accent1">
-              <a:shade val="50000"/>
-            </a:schemeClr>
-          </a:lnRef>
-          <a:fillRef idx="1003">
-            <a:schemeClr val="dk2"/>
-          </a:fillRef>
-          <a:effectRef idx="0">
-            <a:schemeClr val="accent1"/>
-          </a:effectRef>
-          <a:fontRef idx="minor">
-            <a:schemeClr val="lt1"/>
-          </a:fontRef>
-        </p:style>
-        <p:txBody>
-          <a:bodyPr rtlCol="0" anchor="ctr"/>
-          <a:lstStyle/>
-          <a:p>
-            <a:pPr algn="ctr"/>
-            <a:endParaRPr lang="en-US"/>
-          </a:p>
-        </p:txBody>
-      </p:sp>
-      <p:sp useBgFill="1">
-        <p:nvSpPr>
-          <p:cNvPr id="10" name="Rectangle 9">
-            <a:extLst>
-              <a:ext uri="{FF2B5EF4-FFF2-40B4-BE49-F238E27FC236}">
-                <a16:creationId xmlns:a16="http://schemas.microsoft.com/office/drawing/2014/main" id="{1F759AF4-E342-4E60-8A32-C44A328F2F42}"/>
-              </a:ext>
-              <a:ext uri="{C183D7F6-B498-43B3-948B-1728B52AA6E4}">
-                <adec:decorative xmlns:adec="http://schemas.microsoft.com/office/drawing/2017/decorative" val="1"/>
-              </a:ext>
-            </a:extLst>
-          </p:cNvPr>
-          <p:cNvSpPr>
-            <a:spLocks noGrp="1" noRot="1" noChangeAspect="1" noMove="1" noResize="1" noEditPoints="1" noAdjustHandles="1" noChangeArrowheads="1" noChangeShapeType="1" noTextEdit="1"/>
-          </p:cNvSpPr>
-          <p:nvPr>
-            <p:extLst>
-              <p:ext uri="{386F3935-93C4-4BCD-93E2-E3B085C9AB24}">
-                <p16:designElem xmlns:p16="http://schemas.microsoft.com/office/powerpoint/2015/main" val="1"/>
-              </p:ext>
-            </p:extLst>
-          </p:nvPr>
-        </p:nvSpPr>
-        <p:spPr bwMode="ltGray">
-          <a:xfrm>
-            <a:off x="321564" y="320040"/>
-            <a:ext cx="11548872" cy="6217920"/>
-          </a:xfrm>
-          <a:prstGeom prst="rect">
-            <a:avLst/>
-          </a:prstGeom>
-          <a:ln w="15875" cap="sq" cmpd="sng">
-            <a:noFill/>
-            <a:miter lim="800000"/>
-          </a:ln>
-        </p:spPr>
-        <p:style>
-          <a:lnRef idx="2">
-            <a:schemeClr val="accent1">
-              <a:shade val="50000"/>
-            </a:schemeClr>
-          </a:lnRef>
-          <a:fillRef idx="1">
-            <a:schemeClr val="accent1"/>
-          </a:fillRef>
-          <a:effectRef idx="0">
-            <a:schemeClr val="accent1"/>
-          </a:effectRef>
-          <a:fontRef idx="minor">
-            <a:schemeClr val="lt1"/>
-          </a:fontRef>
-        </p:style>
-        <p:txBody>
-          <a:bodyPr rtlCol="0" anchor="ctr"/>
-          <a:lstStyle/>
-          <a:p>
-            <a:pPr algn="ctr"/>
-            <a:endParaRPr lang="en-US"/>
-          </a:p>
-        </p:txBody>
-      </p:sp>
-      <p:sp>
-        <p:nvSpPr>
-          <p:cNvPr id="2" name="Titel 1">
-            <a:extLst>
-              <a:ext uri="{FF2B5EF4-FFF2-40B4-BE49-F238E27FC236}">
-                <a16:creationId xmlns:a16="http://schemas.microsoft.com/office/drawing/2014/main" id="{BE2B93A9-C90F-D94A-B0EB-08FDCD86FAAD}"/>
-              </a:ext>
-            </a:extLst>
-          </p:cNvPr>
-          <p:cNvSpPr>
-            <a:spLocks noGrp="1"/>
-          </p:cNvSpPr>
-          <p:nvPr>
-            <p:ph type="title"/>
-          </p:nvPr>
-        </p:nvSpPr>
-        <p:spPr>
-          <a:xfrm>
-            <a:off x="924443" y="1023257"/>
-            <a:ext cx="3732902" cy="4570457"/>
-          </a:xfrm>
-          <a:effectLst/>
-        </p:spPr>
-        <p:txBody>
-          <a:bodyPr>
-            <a:normAutofit/>
-          </a:bodyPr>
-          <a:lstStyle/>
-          <a:p>
-            <a:pPr algn="l"/>
-            <a:r>
-              <a:rPr lang="da-DK" dirty="0"/>
-              <a:t>Technical </a:t>
-            </a:r>
-            <a:r>
-              <a:rPr lang="da-DK" dirty="0" err="1"/>
-              <a:t>challenges</a:t>
-            </a:r>
-            <a:r>
-              <a:rPr lang="da-DK" dirty="0"/>
-              <a:t>	</a:t>
-            </a:r>
-          </a:p>
-        </p:txBody>
-      </p:sp>
-      <p:cxnSp>
-        <p:nvCxnSpPr>
-          <p:cNvPr id="15" name="Straight Connector 11">
-            <a:extLst>
-              <a:ext uri="{FF2B5EF4-FFF2-40B4-BE49-F238E27FC236}">
-                <a16:creationId xmlns:a16="http://schemas.microsoft.com/office/drawing/2014/main" id="{A49B2805-6469-407A-A68A-BB85AC8A8596}"/>
-              </a:ext>
-              <a:ext uri="{C183D7F6-B498-43B3-948B-1728B52AA6E4}">
-                <adec:decorative xmlns:adec="http://schemas.microsoft.com/office/drawing/2017/decorative" val="1"/>
-              </a:ext>
-            </a:extLst>
-          </p:cNvPr>
-          <p:cNvCxnSpPr>
-            <a:cxnSpLocks noGrp="1" noRot="1" noChangeAspect="1" noMove="1" noResize="1" noEditPoints="1" noAdjustHandles="1" noChangeArrowheads="1" noChangeShapeType="1"/>
-          </p:cNvCxnSpPr>
-          <p:nvPr>
-            <p:extLst>
-              <p:ext uri="{386F3935-93C4-4BCD-93E2-E3B085C9AB24}">
-                <p16:designElem xmlns:p16="http://schemas.microsoft.com/office/powerpoint/2015/main" val="1"/>
-              </p:ext>
-            </p:extLst>
-          </p:nvPr>
-        </p:nvCxnSpPr>
-        <p:spPr>
-          <a:xfrm>
-            <a:off x="4968371" y="2057399"/>
-            <a:ext cx="0" cy="2743200"/>
-          </a:xfrm>
-          <a:prstGeom prst="line">
-            <a:avLst/>
-          </a:prstGeom>
-          <a:ln w="19050">
-            <a:solidFill>
-              <a:schemeClr val="accent1"/>
-            </a:solidFill>
-          </a:ln>
-        </p:spPr>
-        <p:style>
-          <a:lnRef idx="1">
-            <a:schemeClr val="accent1"/>
-          </a:lnRef>
-          <a:fillRef idx="0">
-            <a:schemeClr val="accent1"/>
-          </a:fillRef>
-          <a:effectRef idx="0">
-            <a:schemeClr val="accent1"/>
-          </a:effectRef>
-          <a:fontRef idx="minor">
-            <a:schemeClr val="tx1"/>
-          </a:fontRef>
-        </p:style>
-      </p:cxnSp>
-      <p:sp>
-        <p:nvSpPr>
-          <p:cNvPr id="16" name="Pladsholder til indhold 2">
-            <a:extLst>
-              <a:ext uri="{FF2B5EF4-FFF2-40B4-BE49-F238E27FC236}">
-                <a16:creationId xmlns:a16="http://schemas.microsoft.com/office/drawing/2014/main" id="{3066347D-E5F1-7545-BBF8-AD11A17F2088}"/>
-              </a:ext>
-            </a:extLst>
-          </p:cNvPr>
-          <p:cNvSpPr>
-            <a:spLocks noGrp="1"/>
-          </p:cNvSpPr>
-          <p:nvPr>
-            <p:ph idx="1"/>
-          </p:nvPr>
-        </p:nvSpPr>
-        <p:spPr>
-          <a:xfrm>
-            <a:off x="5252560" y="1023257"/>
-            <a:ext cx="6025645" cy="4570457"/>
-          </a:xfrm>
-          <a:effectLst/>
-        </p:spPr>
-        <p:txBody>
-          <a:bodyPr anchor="ctr">
-            <a:normAutofit lnSpcReduction="10000"/>
-          </a:bodyPr>
-          <a:lstStyle/>
-          <a:p>
-            <a:pPr marL="36900" indent="0">
-              <a:buNone/>
-            </a:pPr>
-            <a:r>
-              <a:rPr lang="da-DK" dirty="0"/>
-              <a:t>Problems:</a:t>
-            </a:r>
-          </a:p>
-          <a:p>
-            <a:r>
-              <a:rPr lang="da-DK" dirty="0"/>
-              <a:t>How to </a:t>
-            </a:r>
-            <a:r>
-              <a:rPr lang="da-DK" dirty="0" err="1"/>
-              <a:t>use</a:t>
-            </a:r>
-            <a:r>
-              <a:rPr lang="da-DK" dirty="0"/>
-              <a:t> </a:t>
-            </a:r>
-            <a:r>
-              <a:rPr lang="da-DK" dirty="0" err="1"/>
-              <a:t>refresh</a:t>
-            </a:r>
-            <a:r>
-              <a:rPr lang="da-DK" dirty="0"/>
-              <a:t> </a:t>
-            </a:r>
-            <a:r>
-              <a:rPr lang="da-DK" dirty="0" err="1"/>
-              <a:t>token</a:t>
-            </a:r>
-            <a:r>
-              <a:rPr lang="da-DK" dirty="0"/>
-              <a:t>, so </a:t>
-            </a:r>
-            <a:r>
-              <a:rPr lang="da-DK" dirty="0" err="1"/>
-              <a:t>you</a:t>
-            </a:r>
-            <a:r>
-              <a:rPr lang="da-DK" dirty="0"/>
-              <a:t> dont have to </a:t>
-            </a:r>
-            <a:r>
-              <a:rPr lang="da-DK" dirty="0" err="1"/>
-              <a:t>get</a:t>
-            </a:r>
-            <a:r>
-              <a:rPr lang="da-DK" dirty="0"/>
-              <a:t> new </a:t>
-            </a:r>
-            <a:r>
-              <a:rPr lang="da-DK" dirty="0" err="1"/>
-              <a:t>token</a:t>
-            </a:r>
-            <a:r>
-              <a:rPr lang="da-DK" dirty="0"/>
-              <a:t> </a:t>
-            </a:r>
-            <a:r>
-              <a:rPr lang="da-DK" dirty="0" err="1"/>
-              <a:t>every</a:t>
-            </a:r>
-            <a:r>
-              <a:rPr lang="da-DK" dirty="0"/>
-              <a:t> 7 </a:t>
-            </a:r>
-            <a:r>
-              <a:rPr lang="da-DK" dirty="0" err="1"/>
-              <a:t>days</a:t>
-            </a:r>
-            <a:r>
-              <a:rPr lang="da-DK" dirty="0"/>
-              <a:t> due to </a:t>
-            </a:r>
-            <a:r>
-              <a:rPr lang="da-DK" dirty="0" err="1"/>
-              <a:t>expiry</a:t>
-            </a:r>
-            <a:r>
-              <a:rPr lang="da-DK" dirty="0"/>
-              <a:t>?</a:t>
-            </a:r>
-            <a:br>
-              <a:rPr lang="da-DK" dirty="0"/>
-            </a:br>
-            <a:endParaRPr lang="da-DK" dirty="0"/>
-          </a:p>
-          <a:p>
-            <a:r>
-              <a:rPr lang="da-DK" dirty="0"/>
-              <a:t>Webservice for radio? </a:t>
-            </a:r>
-            <a:r>
-              <a:rPr lang="da-DK" dirty="0" err="1"/>
-              <a:t>Maybe</a:t>
-            </a:r>
-            <a:r>
-              <a:rPr lang="da-DK" dirty="0"/>
-              <a:t> Alexa </a:t>
-            </a:r>
-            <a:r>
-              <a:rPr lang="da-DK" dirty="0" err="1"/>
-              <a:t>tuneIn</a:t>
-            </a:r>
-            <a:r>
-              <a:rPr lang="da-DK" dirty="0"/>
-              <a:t>, or </a:t>
-            </a:r>
-            <a:r>
-              <a:rPr lang="da-DK" dirty="0" err="1"/>
-              <a:t>another</a:t>
-            </a:r>
-            <a:r>
-              <a:rPr lang="da-DK" dirty="0"/>
-              <a:t> Amazon service</a:t>
-            </a:r>
-          </a:p>
-          <a:p>
-            <a:pPr marL="36900" indent="0">
-              <a:buNone/>
-            </a:pPr>
-            <a:endParaRPr lang="da-DK" dirty="0"/>
-          </a:p>
-          <a:p>
-            <a:r>
-              <a:rPr lang="da-DK" dirty="0" err="1"/>
-              <a:t>Free</a:t>
-            </a:r>
-            <a:r>
-              <a:rPr lang="da-DK" dirty="0"/>
-              <a:t> mail/SMS API service? </a:t>
-            </a:r>
-          </a:p>
-          <a:p>
-            <a:endParaRPr lang="da-DK" dirty="0"/>
-          </a:p>
-          <a:p>
-            <a:pPr marL="36900" indent="0">
-              <a:buNone/>
-            </a:pPr>
-            <a:endParaRPr lang="da-DK" dirty="0"/>
-          </a:p>
-          <a:p>
-            <a:pPr marL="36900" indent="0">
-              <a:buNone/>
-            </a:pPr>
-            <a:endParaRPr lang="da-DK" dirty="0"/>
-          </a:p>
-          <a:p>
-            <a:pPr marL="36900" indent="0">
-              <a:buNone/>
-            </a:pPr>
-            <a:r>
-              <a:rPr lang="da-DK" dirty="0" err="1"/>
-              <a:t>Questions</a:t>
-            </a:r>
-            <a:r>
-              <a:rPr lang="da-DK" dirty="0"/>
-              <a:t>???</a:t>
-            </a:r>
-          </a:p>
-          <a:p>
-            <a:pPr marL="36900" indent="0">
-              <a:buNone/>
-            </a:pPr>
-            <a:endParaRPr lang="da-DK" dirty="0"/>
-          </a:p>
-        </p:txBody>
-      </p:sp>
-    </p:spTree>
-    <p:extLst>
-      <p:ext uri="{BB962C8B-B14F-4D97-AF65-F5344CB8AC3E}">
-        <p14:creationId xmlns:p14="http://schemas.microsoft.com/office/powerpoint/2010/main" val="139205472"/>
-      </p:ext>
-    </p:extLst>
-  </p:cSld>
-  <p:clrMapOvr>
-    <a:overrideClrMapping bg1="lt1" tx1="dk1" bg2="lt2" tx2="dk2" accent1="accent1" accent2="accent2" accent3="accent3" accent4="accent4" accent5="accent5" accent6="accent6" hlink="hlink" folHlink="folHlink"/>
-  </p:clrMapOvr>
-</p:sld>
-</file>
-
 <file path=ppt/theme/theme1.xml><?xml version="1.0" encoding="utf-8"?>
 <a:theme xmlns:a="http://schemas.openxmlformats.org/drawingml/2006/main" name="SlateVTI">
   <a:themeElements>

</xml_diff>